<commit_message>
Correct grammer in powerpoint file
</commit_message>
<xml_diff>
--- a/Project 1.pptx
+++ b/Project 1.pptx
@@ -725,8 +725,8 @@
         </p:nvSpPr>
         <p:spPr>
           <a:xfrm>
-            <a:off x="381300" y="685800"/>
-            <a:ext cx="6096075" cy="3429000"/>
+            <a:off x="381000" y="685800"/>
+            <a:ext cx="6096000" cy="3429000"/>
           </a:xfrm>
           <a:custGeom>
             <a:avLst/>
@@ -829,7 +829,7 @@
         </p:nvSpPr>
         <p:spPr>
           <a:xfrm>
-            <a:off x="381300" y="685800"/>
+            <a:off x="381000" y="685800"/>
             <a:ext cx="6096000" cy="3429000"/>
           </a:xfrm>
           <a:custGeom>
@@ -933,7 +933,7 @@
         </p:nvSpPr>
         <p:spPr>
           <a:xfrm>
-            <a:off x="381300" y="685800"/>
+            <a:off x="381000" y="685800"/>
             <a:ext cx="6096000" cy="3429000"/>
           </a:xfrm>
           <a:custGeom>
@@ -1037,7 +1037,7 @@
         </p:nvSpPr>
         <p:spPr>
           <a:xfrm>
-            <a:off x="381300" y="685800"/>
+            <a:off x="381000" y="685800"/>
             <a:ext cx="6096000" cy="3429000"/>
           </a:xfrm>
           <a:custGeom>
@@ -1141,7 +1141,7 @@
         </p:nvSpPr>
         <p:spPr>
           <a:xfrm>
-            <a:off x="381300" y="685800"/>
+            <a:off x="381000" y="685800"/>
             <a:ext cx="6096000" cy="3429000"/>
           </a:xfrm>
           <a:custGeom>
@@ -1245,7 +1245,7 @@
         </p:nvSpPr>
         <p:spPr>
           <a:xfrm>
-            <a:off x="381300" y="685800"/>
+            <a:off x="381000" y="685800"/>
             <a:ext cx="6096000" cy="3429000"/>
           </a:xfrm>
           <a:custGeom>
@@ -6176,6 +6176,17 @@
 <file path=ppt/slides/slide1.xml><?xml version="1.0" encoding="utf-8"?>
 <p:sld xmlns:a="http://schemas.openxmlformats.org/drawingml/2006/main" xmlns:r="http://schemas.openxmlformats.org/officeDocument/2006/relationships" xmlns:p="http://schemas.openxmlformats.org/presentationml/2006/main">
   <p:cSld>
+    <p:bg>
+      <p:bgPr>
+        <a:blipFill>
+          <a:blip r:embed="rId3"/>
+          <a:stretch>
+            <a:fillRect/>
+          </a:stretch>
+        </a:blipFill>
+        <a:effectLst/>
+      </p:bgPr>
+    </p:bg>
     <p:spTree>
       <p:nvGrpSpPr>
         <p:cNvPr id="1" name="Shape 53"/>
@@ -6202,8 +6213,8 @@
         </p:nvSpPr>
         <p:spPr>
           <a:xfrm>
-            <a:off x="311708" y="744575"/>
-            <a:ext cx="8520600" cy="2052600"/>
+            <a:off x="-702445" y="-70680"/>
+            <a:ext cx="8520600" cy="1292571"/>
           </a:xfrm>
           <a:prstGeom prst="rect">
             <a:avLst/>
@@ -6225,10 +6236,10 @@
               <a:buNone/>
             </a:pPr>
             <a:r>
-              <a:rPr lang="en"/>
+              <a:rPr lang="en" dirty="0"/>
               <a:t>Wanderlust</a:t>
             </a:r>
-            <a:endParaRPr/>
+            <a:endParaRPr dirty="0"/>
           </a:p>
         </p:txBody>
       </p:sp>
@@ -6243,13 +6254,16 @@
           </p:nvPr>
         </p:nvSpPr>
         <p:spPr>
-          <a:xfrm>
-            <a:off x="311700" y="2834125"/>
-            <a:ext cx="8520600" cy="792600"/>
+          <a:xfrm rot="21059485">
+            <a:off x="2204318" y="3753772"/>
+            <a:ext cx="6920309" cy="792600"/>
           </a:xfrm>
           <a:prstGeom prst="rect">
             <a:avLst/>
           </a:prstGeom>
+          <a:solidFill>
+            <a:schemeClr val="lt1"/>
+          </a:solidFill>
         </p:spPr>
         <p:txBody>
           <a:bodyPr spcFirstLastPara="1" wrap="square" lIns="91425" tIns="91425" rIns="91425" bIns="91425" anchor="t" anchorCtr="0">
@@ -6267,10 +6281,18 @@
               <a:buNone/>
             </a:pPr>
             <a:r>
-              <a:rPr lang="en"/>
+              <a:rPr lang="en" sz="3200" b="1" dirty="0">
+                <a:solidFill>
+                  <a:srgbClr val="FF0000"/>
+                </a:solidFill>
+              </a:rPr>
               <a:t>Know ahead, don’t end up dead!</a:t>
             </a:r>
-            <a:endParaRPr/>
+            <a:endParaRPr sz="3200" b="1" dirty="0">
+              <a:solidFill>
+                <a:srgbClr val="FF0000"/>
+              </a:solidFill>
+            </a:endParaRPr>
           </a:p>
         </p:txBody>
       </p:sp>
@@ -6279,13 +6301,13 @@
   <p:clrMapOvr>
     <a:masterClrMapping/>
   </p:clrMapOvr>
-  <mc:AlternateContent xmlns:mc="http://schemas.openxmlformats.org/markup-compatibility/2006">
-    <mc:Choice xmlns:p159="http://schemas.microsoft.com/office/powerpoint/2015/09/main" Requires="p159">
+  <mc:AlternateContent xmlns:mc="http://schemas.openxmlformats.org/markup-compatibility/2006" xmlns:p159="http://schemas.microsoft.com/office/powerpoint/2015/09/main">
+    <mc:Choice Requires="p159">
       <p:transition xmlns:p14="http://schemas.microsoft.com/office/powerpoint/2010/main" spd="slow" p14:dur="2000">
         <p159:morph option="byObject"/>
       </p:transition>
     </mc:Choice>
-    <mc:Fallback>
+    <mc:Fallback xmlns="">
       <p:transition spd="slow">
         <p:fade/>
       </p:transition>
@@ -6297,6 +6319,20 @@
 <file path=ppt/slides/slide2.xml><?xml version="1.0" encoding="utf-8"?>
 <p:sld xmlns:a="http://schemas.openxmlformats.org/drawingml/2006/main" xmlns:r="http://schemas.openxmlformats.org/officeDocument/2006/relationships" xmlns:p="http://schemas.openxmlformats.org/presentationml/2006/main">
   <p:cSld>
+    <p:bg>
+      <p:bgPr>
+        <a:blipFill dpi="0" rotWithShape="1">
+          <a:blip r:embed="rId3">
+            <a:lum/>
+          </a:blip>
+          <a:srcRect/>
+          <a:stretch>
+            <a:fillRect t="-16000" b="-16000"/>
+          </a:stretch>
+        </a:blipFill>
+        <a:effectLst/>
+      </p:bgPr>
+    </p:bg>
     <p:spTree>
       <p:nvGrpSpPr>
         <p:cNvPr id="1" name="Shape 59"/>
@@ -6311,60 +6347,18 @@
           <a:chExt cx="0" cy="0"/>
         </a:xfrm>
       </p:grpSpPr>
-      <p:sp>
-        <p:nvSpPr>
-          <p:cNvPr id="60" name="Google Shape;60;p14"/>
-          <p:cNvSpPr txBox="1">
-            <a:spLocks noGrp="1"/>
-          </p:cNvSpPr>
-          <p:nvPr>
-            <p:ph type="title"/>
-          </p:nvPr>
-        </p:nvSpPr>
-        <p:spPr>
-          <a:xfrm>
-            <a:off x="311700" y="2150850"/>
-            <a:ext cx="8520600" cy="841800"/>
-          </a:xfrm>
-          <a:prstGeom prst="rect">
-            <a:avLst/>
-          </a:prstGeom>
-        </p:spPr>
-        <p:txBody>
-          <a:bodyPr spcFirstLastPara="1" wrap="square" lIns="91425" tIns="91425" rIns="91425" bIns="91425" anchor="ctr" anchorCtr="0">
-            <a:noAutofit/>
-          </a:bodyPr>
-          <a:lstStyle/>
-          <a:p>
-            <a:pPr marL="0" lvl="0" indent="0" algn="ctr" rtl="0">
-              <a:spcBef>
-                <a:spcPts val="0"/>
-              </a:spcBef>
-              <a:spcAft>
-                <a:spcPts val="0"/>
-              </a:spcAft>
-              <a:buNone/>
-            </a:pPr>
-            <a:r>
-              <a:rPr lang="en"/>
-              <a:t>Elevator pitch</a:t>
-            </a:r>
-            <a:endParaRPr/>
-          </a:p>
-        </p:txBody>
-      </p:sp>
     </p:spTree>
   </p:cSld>
   <p:clrMapOvr>
     <a:masterClrMapping/>
   </p:clrMapOvr>
-  <mc:AlternateContent xmlns:mc="http://schemas.openxmlformats.org/markup-compatibility/2006">
-    <mc:Choice xmlns:p159="http://schemas.microsoft.com/office/powerpoint/2015/09/main" Requires="p159">
+  <mc:AlternateContent xmlns:mc="http://schemas.openxmlformats.org/markup-compatibility/2006" xmlns:p159="http://schemas.microsoft.com/office/powerpoint/2015/09/main">
+    <mc:Choice Requires="p159">
       <p:transition xmlns:p14="http://schemas.microsoft.com/office/powerpoint/2010/main" spd="slow" p14:dur="2000">
         <p159:morph option="byObject"/>
       </p:transition>
     </mc:Choice>
-    <mc:Fallback>
+    <mc:Fallback xmlns="">
       <p:transition spd="slow">
         <p:fade/>
       </p:transition>
@@ -6376,6 +6370,40 @@
 <file path=ppt/slides/slide3.xml><?xml version="1.0" encoding="utf-8"?>
 <p:sld xmlns:a="http://schemas.openxmlformats.org/drawingml/2006/main" xmlns:r="http://schemas.openxmlformats.org/officeDocument/2006/relationships" xmlns:p="http://schemas.openxmlformats.org/presentationml/2006/main">
   <p:cSld>
+    <p:bg>
+      <p:bgPr>
+        <a:gradFill>
+          <a:gsLst>
+            <a:gs pos="0">
+              <a:schemeClr val="accent1">
+                <a:lumMod val="5000"/>
+                <a:lumOff val="95000"/>
+              </a:schemeClr>
+            </a:gs>
+            <a:gs pos="74000">
+              <a:schemeClr val="accent1">
+                <a:lumMod val="45000"/>
+                <a:lumOff val="55000"/>
+              </a:schemeClr>
+            </a:gs>
+            <a:gs pos="83000">
+              <a:schemeClr val="accent1">
+                <a:lumMod val="45000"/>
+                <a:lumOff val="55000"/>
+              </a:schemeClr>
+            </a:gs>
+            <a:gs pos="100000">
+              <a:schemeClr val="accent1">
+                <a:lumMod val="30000"/>
+                <a:lumOff val="70000"/>
+              </a:schemeClr>
+            </a:gs>
+          </a:gsLst>
+          <a:lin ang="5400000" scaled="1"/>
+        </a:gradFill>
+        <a:effectLst/>
+      </p:bgPr>
+    </p:bg>
     <p:spTree>
       <p:nvGrpSpPr>
         <p:cNvPr id="1" name="Shape 64"/>
@@ -6401,8 +6429,8 @@
           </p:nvPr>
         </p:nvSpPr>
         <p:spPr>
-          <a:xfrm>
-            <a:off x="311700" y="445025"/>
+          <a:xfrm rot="20995047">
+            <a:off x="-2872075" y="288274"/>
             <a:ext cx="8520600" cy="572700"/>
           </a:xfrm>
           <a:prstGeom prst="rect">
@@ -6415,7 +6443,7 @@
           </a:bodyPr>
           <a:lstStyle/>
           <a:p>
-            <a:pPr marL="0" lvl="0" indent="0" algn="l" rtl="0">
+            <a:pPr marL="0" lvl="0" indent="0" algn="ctr" rtl="0">
               <a:spcBef>
                 <a:spcPts val="0"/>
               </a:spcBef>
@@ -6425,10 +6453,18 @@
               <a:buNone/>
             </a:pPr>
             <a:r>
-              <a:rPr lang="en"/>
+              <a:rPr lang="en" b="1" dirty="0">
+                <a:solidFill>
+                  <a:srgbClr val="C00000"/>
+                </a:solidFill>
+              </a:rPr>
               <a:t>Concept</a:t>
             </a:r>
-            <a:endParaRPr/>
+            <a:endParaRPr b="1" dirty="0">
+              <a:solidFill>
+                <a:srgbClr val="C00000"/>
+              </a:solidFill>
+            </a:endParaRPr>
           </a:p>
         </p:txBody>
       </p:sp>
@@ -6468,10 +6504,10 @@
               <a:buChar char="●"/>
             </a:pPr>
             <a:r>
-              <a:rPr lang="en"/>
+              <a:rPr lang="en" sz="2400" dirty="0"/>
               <a:t>Travel app that allows the user to plan their trip</a:t>
             </a:r>
-            <a:endParaRPr/>
+            <a:endParaRPr sz="2400" dirty="0"/>
           </a:p>
           <a:p>
             <a:pPr marL="457200" lvl="0" indent="-342900" algn="l" rtl="0">
@@ -6485,10 +6521,10 @@
               <a:buChar char="●"/>
             </a:pPr>
             <a:r>
-              <a:rPr lang="en"/>
+              <a:rPr lang="en" sz="2400" dirty="0"/>
               <a:t>With all the travel apps available today, being able to search a city, explore the area and help plan their itinerary in one place is a must have. </a:t>
             </a:r>
-            <a:endParaRPr/>
+            <a:endParaRPr sz="2400" dirty="0"/>
           </a:p>
           <a:p>
             <a:pPr marL="457200" lvl="0" indent="-342900" algn="l" rtl="0">
@@ -6502,10 +6538,14 @@
               <a:buChar char="●"/>
             </a:pPr>
             <a:r>
-              <a:rPr lang="en"/>
-              <a:t>User story</a:t>
+              <a:rPr lang="en" sz="2400" dirty="0"/>
+              <a:t>As a user, I want </a:t>
             </a:r>
-            <a:endParaRPr/>
+            <a:r>
+              <a:rPr lang="en-US" sz="2400" dirty="0"/>
+              <a:t>to search for a city, find out where it is and know what would be fun to check out if I decide to visit.</a:t>
+            </a:r>
+            <a:endParaRPr sz="2400" dirty="0"/>
           </a:p>
         </p:txBody>
       </p:sp>
@@ -6514,13 +6554,13 @@
   <p:clrMapOvr>
     <a:masterClrMapping/>
   </p:clrMapOvr>
-  <mc:AlternateContent xmlns:mc="http://schemas.openxmlformats.org/markup-compatibility/2006">
-    <mc:Choice xmlns:p159="http://schemas.microsoft.com/office/powerpoint/2015/09/main" Requires="p159">
+  <mc:AlternateContent xmlns:mc="http://schemas.openxmlformats.org/markup-compatibility/2006" xmlns:p159="http://schemas.microsoft.com/office/powerpoint/2015/09/main">
+    <mc:Choice Requires="p159">
       <p:transition xmlns:p14="http://schemas.microsoft.com/office/powerpoint/2010/main" spd="slow" p14:dur="2000">
         <p159:morph option="byObject"/>
       </p:transition>
     </mc:Choice>
-    <mc:Fallback>
+    <mc:Fallback xmlns="">
       <p:transition spd="slow">
         <p:fade/>
       </p:transition>
@@ -6532,6 +6572,40 @@
 <file path=ppt/slides/slide4.xml><?xml version="1.0" encoding="utf-8"?>
 <p:sld xmlns:a="http://schemas.openxmlformats.org/drawingml/2006/main" xmlns:r="http://schemas.openxmlformats.org/officeDocument/2006/relationships" xmlns:p="http://schemas.openxmlformats.org/presentationml/2006/main">
   <p:cSld>
+    <p:bg>
+      <p:bgPr>
+        <a:gradFill>
+          <a:gsLst>
+            <a:gs pos="0">
+              <a:schemeClr val="accent1">
+                <a:lumMod val="5000"/>
+                <a:lumOff val="95000"/>
+              </a:schemeClr>
+            </a:gs>
+            <a:gs pos="74000">
+              <a:schemeClr val="accent1">
+                <a:lumMod val="45000"/>
+                <a:lumOff val="55000"/>
+              </a:schemeClr>
+            </a:gs>
+            <a:gs pos="83000">
+              <a:schemeClr val="accent1">
+                <a:lumMod val="45000"/>
+                <a:lumOff val="55000"/>
+              </a:schemeClr>
+            </a:gs>
+            <a:gs pos="100000">
+              <a:schemeClr val="accent1">
+                <a:lumMod val="30000"/>
+                <a:lumOff val="70000"/>
+              </a:schemeClr>
+            </a:gs>
+          </a:gsLst>
+          <a:lin ang="5400000" scaled="1"/>
+        </a:gradFill>
+        <a:effectLst/>
+      </p:bgPr>
+    </p:bg>
     <p:spTree>
       <p:nvGrpSpPr>
         <p:cNvPr id="1" name="Shape 70"/>
@@ -6624,10 +6698,18 @@
               <a:buChar char="●"/>
             </a:pPr>
             <a:r>
-              <a:rPr lang="en"/>
-              <a:t>To achieve our end goal we utilized a few different API’s including Open Weather, Google Maps APi, &amp; Google places API.</a:t>
+              <a:rPr lang="en" dirty="0"/>
+              <a:t>To achieve our end goal we utilized a few different API’s including Open Weather, Google Maps AP</a:t>
             </a:r>
-            <a:endParaRPr/>
+            <a:r>
+              <a:rPr lang="en-US" dirty="0"/>
+              <a:t>I,</a:t>
+            </a:r>
+            <a:r>
+              <a:rPr lang="en" dirty="0"/>
+              <a:t> &amp; Google places API.</a:t>
+            </a:r>
+            <a:endParaRPr dirty="0"/>
           </a:p>
           <a:p>
             <a:pPr marL="457200" lvl="0" indent="-342900" algn="l" rtl="0">
@@ -6641,11 +6723,11 @@
               <a:buChar char="●"/>
             </a:pPr>
             <a:r>
-              <a:rPr lang="en"/>
+              <a:rPr lang="en" dirty="0"/>
               <a:t>Sydney mastered the html and display aspects utilizing Materialize CSS (</a:t>
             </a:r>
             <a:r>
-              <a:rPr lang="en" sz="1100" u="sng">
+              <a:rPr lang="en" sz="1100" u="sng" dirty="0">
                 <a:solidFill>
                   <a:schemeClr val="hlink"/>
                 </a:solidFill>
@@ -6654,10 +6736,26 @@
               <a:t>https://materializecss.com/</a:t>
             </a:r>
             <a:r>
-              <a:rPr lang="en"/>
-              <a:t>). James worked on the logic to achieve the functionality and researched what  each API required to make function. Maxwell setup the Github repository and created a new project that allowed us to assign the assorted tasks. He also created custom graphics to bring our app alive. </a:t>
+              <a:rPr lang="en" dirty="0"/>
+              <a:t>). James worked on the logic to achieve the functionality and researched what  each API required to make function. Maxwell setup the Github repository, created a new project that allowed us to assign the assorted tasks, </a:t>
             </a:r>
-            <a:endParaRPr/>
+            <a:r>
+              <a:rPr lang="en-US" dirty="0"/>
+              <a:t>made the Readme, and </a:t>
+            </a:r>
+            <a:r>
+              <a:rPr lang="en" dirty="0"/>
+              <a:t>created </a:t>
+            </a:r>
+            <a:r>
+              <a:rPr lang="en-US" dirty="0"/>
+              <a:t>a </a:t>
+            </a:r>
+            <a:r>
+              <a:rPr lang="en" dirty="0"/>
+              <a:t>custom graphic to bring our app alive. </a:t>
+            </a:r>
+            <a:endParaRPr dirty="0"/>
           </a:p>
           <a:p>
             <a:pPr marL="457200" lvl="0" indent="-342900" algn="l" rtl="0">
@@ -6671,10 +6769,10 @@
               <a:buChar char="●"/>
             </a:pPr>
             <a:r>
-              <a:rPr lang="en"/>
+              <a:rPr lang="en" dirty="0"/>
               <a:t>One challenge we had was Google requires a different call then a normal AJAX call. </a:t>
             </a:r>
-            <a:endParaRPr/>
+            <a:endParaRPr dirty="0"/>
           </a:p>
           <a:p>
             <a:pPr marL="457200" lvl="0" indent="-342900" algn="l" rtl="0">
@@ -6688,10 +6786,10 @@
               <a:buChar char="●"/>
             </a:pPr>
             <a:r>
-              <a:rPr lang="en"/>
+              <a:rPr lang="en" dirty="0"/>
               <a:t>Our biggest success was finally being able to display the map in our app.</a:t>
             </a:r>
-            <a:endParaRPr/>
+            <a:endParaRPr dirty="0"/>
           </a:p>
         </p:txBody>
       </p:sp>
@@ -6700,13 +6798,13 @@
   <p:clrMapOvr>
     <a:masterClrMapping/>
   </p:clrMapOvr>
-  <mc:AlternateContent xmlns:mc="http://schemas.openxmlformats.org/markup-compatibility/2006">
-    <mc:Choice xmlns:p159="http://schemas.microsoft.com/office/powerpoint/2015/09/main" Requires="p159">
+  <mc:AlternateContent xmlns:mc="http://schemas.openxmlformats.org/markup-compatibility/2006" xmlns:p159="http://schemas.microsoft.com/office/powerpoint/2015/09/main">
+    <mc:Choice Requires="p159">
       <p:transition xmlns:p14="http://schemas.microsoft.com/office/powerpoint/2010/main" spd="slow" p14:dur="2000">
         <p159:morph option="byObject"/>
       </p:transition>
     </mc:Choice>
-    <mc:Fallback>
+    <mc:Fallback xmlns="">
       <p:transition spd="slow">
         <p:fade/>
       </p:transition>
@@ -6718,6 +6816,40 @@
 <file path=ppt/slides/slide5.xml><?xml version="1.0" encoding="utf-8"?>
 <p:sld xmlns:a="http://schemas.openxmlformats.org/drawingml/2006/main" xmlns:r="http://schemas.openxmlformats.org/officeDocument/2006/relationships" xmlns:p="http://schemas.openxmlformats.org/presentationml/2006/main">
   <p:cSld>
+    <p:bg>
+      <p:bgPr>
+        <a:gradFill>
+          <a:gsLst>
+            <a:gs pos="0">
+              <a:schemeClr val="accent1">
+                <a:lumMod val="5000"/>
+                <a:lumOff val="95000"/>
+              </a:schemeClr>
+            </a:gs>
+            <a:gs pos="74000">
+              <a:schemeClr val="accent1">
+                <a:lumMod val="45000"/>
+                <a:lumOff val="55000"/>
+              </a:schemeClr>
+            </a:gs>
+            <a:gs pos="83000">
+              <a:schemeClr val="accent1">
+                <a:lumMod val="45000"/>
+                <a:lumOff val="55000"/>
+              </a:schemeClr>
+            </a:gs>
+            <a:gs pos="100000">
+              <a:schemeClr val="accent1">
+                <a:lumMod val="30000"/>
+                <a:lumOff val="70000"/>
+              </a:schemeClr>
+            </a:gs>
+          </a:gsLst>
+          <a:lin ang="5400000" scaled="1"/>
+        </a:gradFill>
+        <a:effectLst/>
+      </p:bgPr>
+    </p:bg>
     <p:spTree>
       <p:nvGrpSpPr>
         <p:cNvPr id="1" name="Shape 76"/>
@@ -6732,60 +6864,48 @@
           <a:chExt cx="0" cy="0"/>
         </a:xfrm>
       </p:grpSpPr>
-      <p:sp>
-        <p:nvSpPr>
-          <p:cNvPr id="77" name="Google Shape;77;p17"/>
-          <p:cNvSpPr txBox="1">
-            <a:spLocks noGrp="1"/>
-          </p:cNvSpPr>
-          <p:nvPr>
-            <p:ph type="title"/>
-          </p:nvPr>
-        </p:nvSpPr>
+      <p:pic>
+        <p:nvPicPr>
+          <p:cNvPr id="5" name="Picture 4" descr="A close up of a sign&#10;&#10;Description automatically generated">
+            <a:extLst>
+              <a:ext uri="{FF2B5EF4-FFF2-40B4-BE49-F238E27FC236}">
+                <a16:creationId xmlns:a16="http://schemas.microsoft.com/office/drawing/2014/main" id="{010E3368-BE53-48FB-812E-F6DFC73E7808}"/>
+              </a:ext>
+            </a:extLst>
+          </p:cNvPr>
+          <p:cNvPicPr>
+            <a:picLocks noChangeAspect="1"/>
+          </p:cNvPicPr>
+          <p:nvPr/>
+        </p:nvPicPr>
+        <p:blipFill>
+          <a:blip r:embed="rId3"/>
+          <a:stretch>
+            <a:fillRect/>
+          </a:stretch>
+        </p:blipFill>
         <p:spPr>
           <a:xfrm>
-            <a:off x="311700" y="2150850"/>
-            <a:ext cx="8520600" cy="841800"/>
+            <a:off x="489080" y="364210"/>
+            <a:ext cx="7958379" cy="4533254"/>
           </a:xfrm>
           <a:prstGeom prst="rect">
             <a:avLst/>
           </a:prstGeom>
         </p:spPr>
-        <p:txBody>
-          <a:bodyPr spcFirstLastPara="1" wrap="square" lIns="91425" tIns="91425" rIns="91425" bIns="91425" anchor="ctr" anchorCtr="0">
-            <a:noAutofit/>
-          </a:bodyPr>
-          <a:lstStyle/>
-          <a:p>
-            <a:pPr marL="0" lvl="0" indent="0" algn="ctr" rtl="0">
-              <a:spcBef>
-                <a:spcPts val="0"/>
-              </a:spcBef>
-              <a:spcAft>
-                <a:spcPts val="0"/>
-              </a:spcAft>
-              <a:buNone/>
-            </a:pPr>
-            <a:r>
-              <a:rPr lang="en"/>
-              <a:t>Demo</a:t>
-            </a:r>
-            <a:endParaRPr/>
-          </a:p>
-        </p:txBody>
-      </p:sp>
+      </p:pic>
     </p:spTree>
   </p:cSld>
   <p:clrMapOvr>
     <a:masterClrMapping/>
   </p:clrMapOvr>
-  <mc:AlternateContent xmlns:mc="http://schemas.openxmlformats.org/markup-compatibility/2006">
-    <mc:Choice xmlns:p159="http://schemas.microsoft.com/office/powerpoint/2015/09/main" Requires="p159">
+  <mc:AlternateContent xmlns:mc="http://schemas.openxmlformats.org/markup-compatibility/2006" xmlns:p159="http://schemas.microsoft.com/office/powerpoint/2015/09/main">
+    <mc:Choice Requires="p159">
       <p:transition xmlns:p14="http://schemas.microsoft.com/office/powerpoint/2010/main" spd="slow" p14:dur="2000">
         <p159:morph option="byObject"/>
       </p:transition>
     </mc:Choice>
-    <mc:Fallback>
+    <mc:Fallback xmlns="">
       <p:transition spd="slow">
         <p:fade/>
       </p:transition>
@@ -6797,6 +6917,40 @@
 <file path=ppt/slides/slide6.xml><?xml version="1.0" encoding="utf-8"?>
 <p:sld xmlns:a="http://schemas.openxmlformats.org/drawingml/2006/main" xmlns:r="http://schemas.openxmlformats.org/officeDocument/2006/relationships" xmlns:p="http://schemas.openxmlformats.org/presentationml/2006/main">
   <p:cSld>
+    <p:bg>
+      <p:bgPr>
+        <a:gradFill>
+          <a:gsLst>
+            <a:gs pos="0">
+              <a:schemeClr val="accent1">
+                <a:lumMod val="5000"/>
+                <a:lumOff val="95000"/>
+              </a:schemeClr>
+            </a:gs>
+            <a:gs pos="74000">
+              <a:schemeClr val="accent1">
+                <a:lumMod val="45000"/>
+                <a:lumOff val="55000"/>
+              </a:schemeClr>
+            </a:gs>
+            <a:gs pos="83000">
+              <a:schemeClr val="accent1">
+                <a:lumMod val="45000"/>
+                <a:lumOff val="55000"/>
+              </a:schemeClr>
+            </a:gs>
+            <a:gs pos="100000">
+              <a:schemeClr val="accent1">
+                <a:lumMod val="30000"/>
+                <a:lumOff val="70000"/>
+              </a:schemeClr>
+            </a:gs>
+          </a:gsLst>
+          <a:lin ang="5400000" scaled="1"/>
+        </a:gradFill>
+        <a:effectLst/>
+      </p:bgPr>
+    </p:bg>
     <p:spTree>
       <p:nvGrpSpPr>
         <p:cNvPr id="1" name="Shape 81"/>
@@ -6836,7 +6990,7 @@
           </a:bodyPr>
           <a:lstStyle/>
           <a:p>
-            <a:pPr marL="0" lvl="0" indent="0" algn="l" rtl="0">
+            <a:pPr marL="0" lvl="0" indent="0" algn="ctr" rtl="0">
               <a:spcBef>
                 <a:spcPts val="0"/>
               </a:spcBef>
@@ -6846,10 +7000,10 @@
               <a:buNone/>
             </a:pPr>
             <a:r>
-              <a:rPr lang="en"/>
+              <a:rPr lang="en" sz="3200" b="1" dirty="0"/>
               <a:t>Directions for Future Development</a:t>
             </a:r>
-            <a:endParaRPr/>
+            <a:endParaRPr sz="3200" b="1" dirty="0"/>
           </a:p>
         </p:txBody>
       </p:sp>
@@ -6889,10 +7043,18 @@
               <a:buChar char="●"/>
             </a:pPr>
             <a:r>
-              <a:rPr lang="en" dirty="0"/>
-              <a:t>Need to add HTML links for the returned attraction items so the user can easily get to that attractions homepage.</a:t>
+              <a:rPr lang="en" sz="2000" dirty="0"/>
+              <a:t>Need to add HTML links for the returned attraction items so the user can easily get to that </a:t>
             </a:r>
-            <a:endParaRPr dirty="0"/>
+            <a:r>
+              <a:rPr lang="en-US" sz="2000" dirty="0"/>
+              <a:t>attraction's</a:t>
+            </a:r>
+            <a:r>
+              <a:rPr lang="en" sz="2000" dirty="0"/>
+              <a:t> homepage.</a:t>
+            </a:r>
+            <a:endParaRPr sz="2000" dirty="0"/>
           </a:p>
           <a:p>
             <a:pPr marL="457200" lvl="0" indent="-342900" algn="l" rtl="0">
@@ -6906,10 +7068,10 @@
               <a:buChar char="●"/>
             </a:pPr>
             <a:r>
-              <a:rPr lang="en" dirty="0"/>
+              <a:rPr lang="en" sz="2000" dirty="0"/>
               <a:t>Need to add markers for the returned attraction list items.</a:t>
             </a:r>
-            <a:endParaRPr dirty="0"/>
+            <a:endParaRPr sz="2000" dirty="0"/>
           </a:p>
           <a:p>
             <a:pPr marL="457200" lvl="0" indent="-342900" algn="l" rtl="0">
@@ -6923,10 +7085,10 @@
               <a:buChar char="●"/>
             </a:pPr>
             <a:r>
-              <a:rPr lang="en" dirty="0"/>
+              <a:rPr lang="en" sz="2000" dirty="0"/>
               <a:t>Need to figure out how to secure the API keys to ensure there is no unwanted access.</a:t>
             </a:r>
-            <a:endParaRPr dirty="0"/>
+            <a:endParaRPr sz="2000" dirty="0"/>
           </a:p>
           <a:p>
             <a:pPr marL="457200" lvl="0" indent="-342900" algn="l" rtl="0">
@@ -6940,10 +7102,30 @@
               <a:buChar char="●"/>
             </a:pPr>
             <a:r>
-              <a:rPr lang="en" dirty="0"/>
+              <a:rPr lang="en" sz="2000" dirty="0"/>
               <a:t>Need to research what is required for a mobile app, both for the Google Play store and the Apple app store.  </a:t>
             </a:r>
-            <a:endParaRPr dirty="0"/>
+          </a:p>
+          <a:p>
+            <a:pPr marL="457200" lvl="0" indent="-342900" algn="l" rtl="0">
+              <a:spcBef>
+                <a:spcPts val="0"/>
+              </a:spcBef>
+              <a:spcAft>
+                <a:spcPts val="0"/>
+              </a:spcAft>
+              <a:buSzPts val="1800"/>
+              <a:buChar char="●"/>
+            </a:pPr>
+            <a:r>
+              <a:rPr lang="en" sz="2000" dirty="0"/>
+              <a:t>Need to allow the user to pi</a:t>
+            </a:r>
+            <a:r>
+              <a:rPr lang="en-US" sz="2000" dirty="0"/>
+              <a:t>ck what city they want if it exists in multiple locations.</a:t>
+            </a:r>
+            <a:endParaRPr sz="2000" dirty="0"/>
           </a:p>
         </p:txBody>
       </p:sp>
@@ -6952,13 +7134,13 @@
   <p:clrMapOvr>
     <a:masterClrMapping/>
   </p:clrMapOvr>
-  <mc:AlternateContent xmlns:mc="http://schemas.openxmlformats.org/markup-compatibility/2006">
-    <mc:Choice xmlns:p159="http://schemas.microsoft.com/office/powerpoint/2015/09/main" Requires="p159">
+  <mc:AlternateContent xmlns:mc="http://schemas.openxmlformats.org/markup-compatibility/2006" xmlns:p159="http://schemas.microsoft.com/office/powerpoint/2015/09/main">
+    <mc:Choice Requires="p159">
       <p:transition xmlns:p14="http://schemas.microsoft.com/office/powerpoint/2010/main" spd="slow" p14:dur="2000">
         <p159:morph option="byObject"/>
       </p:transition>
     </mc:Choice>
-    <mc:Fallback>
+    <mc:Fallback xmlns="">
       <p:transition spd="slow">
         <p:fade/>
       </p:transition>
@@ -6970,6 +7152,40 @@
 <file path=ppt/slides/slide7.xml><?xml version="1.0" encoding="utf-8"?>
 <p:sld xmlns:a="http://schemas.openxmlformats.org/drawingml/2006/main" xmlns:r="http://schemas.openxmlformats.org/officeDocument/2006/relationships" xmlns:p="http://schemas.openxmlformats.org/presentationml/2006/main">
   <p:cSld>
+    <p:bg>
+      <p:bgPr>
+        <a:gradFill>
+          <a:gsLst>
+            <a:gs pos="0">
+              <a:schemeClr val="accent1">
+                <a:lumMod val="5000"/>
+                <a:lumOff val="95000"/>
+              </a:schemeClr>
+            </a:gs>
+            <a:gs pos="74000">
+              <a:schemeClr val="accent1">
+                <a:lumMod val="45000"/>
+                <a:lumOff val="55000"/>
+              </a:schemeClr>
+            </a:gs>
+            <a:gs pos="83000">
+              <a:schemeClr val="accent1">
+                <a:lumMod val="45000"/>
+                <a:lumOff val="55000"/>
+              </a:schemeClr>
+            </a:gs>
+            <a:gs pos="100000">
+              <a:schemeClr val="accent1">
+                <a:lumMod val="30000"/>
+                <a:lumOff val="70000"/>
+              </a:schemeClr>
+            </a:gs>
+          </a:gsLst>
+          <a:lin ang="5400000" scaled="1"/>
+        </a:gradFill>
+        <a:effectLst/>
+      </p:bgPr>
+    </p:bg>
     <p:spTree>
       <p:nvGrpSpPr>
         <p:cNvPr id="1" name="Shape 87"/>
@@ -6996,8 +7212,8 @@
         </p:nvSpPr>
         <p:spPr>
           <a:xfrm>
-            <a:off x="311700" y="445025"/>
-            <a:ext cx="8520600" cy="572700"/>
+            <a:off x="3458094" y="349573"/>
+            <a:ext cx="2227812" cy="572700"/>
           </a:xfrm>
           <a:prstGeom prst="rect">
             <a:avLst/>
@@ -7009,7 +7225,7 @@
           </a:bodyPr>
           <a:lstStyle/>
           <a:p>
-            <a:pPr marL="0" lvl="0" indent="0" algn="l" rtl="0">
+            <a:pPr marL="0" lvl="0" indent="0" algn="ctr" rtl="0">
               <a:spcBef>
                 <a:spcPts val="0"/>
               </a:spcBef>
@@ -7019,10 +7235,10 @@
               <a:buNone/>
             </a:pPr>
             <a:r>
-              <a:rPr lang="en" dirty="0"/>
+              <a:rPr lang="en" sz="4400" b="1" dirty="0"/>
               <a:t>Links</a:t>
             </a:r>
-            <a:endParaRPr dirty="0"/>
+            <a:endParaRPr sz="4400" b="1" dirty="0"/>
           </a:p>
         </p:txBody>
       </p:sp>
@@ -7038,7 +7254,7 @@
         </p:nvSpPr>
         <p:spPr>
           <a:xfrm>
-            <a:off x="311700" y="1152475"/>
+            <a:off x="311700" y="1137812"/>
             <a:ext cx="8520600" cy="3416400"/>
           </a:xfrm>
           <a:prstGeom prst="rect">
@@ -7062,10 +7278,10 @@
               <a:buChar char="●"/>
             </a:pPr>
             <a:r>
-              <a:rPr lang="en" dirty="0"/>
+              <a:rPr lang="en" sz="2400" b="1" dirty="0"/>
               <a:t>Deployed</a:t>
             </a:r>
-            <a:endParaRPr dirty="0"/>
+            <a:endParaRPr sz="2400" b="1" dirty="0"/>
           </a:p>
           <a:p>
             <a:pPr lvl="0" indent="0">
@@ -7111,7 +7327,7 @@
               <a:buChar char="●"/>
             </a:pPr>
             <a:r>
-              <a:rPr lang="en" dirty="0"/>
+              <a:rPr lang="en" sz="2400" b="1" dirty="0"/>
               <a:t>GitHub repo</a:t>
             </a:r>
           </a:p>
@@ -7142,18 +7358,78 @@
           </a:p>
         </p:txBody>
       </p:sp>
+      <p:pic>
+        <p:nvPicPr>
+          <p:cNvPr id="3" name="Picture 2" descr="A close up of a toy&#10;&#10;Description automatically generated">
+            <a:extLst>
+              <a:ext uri="{FF2B5EF4-FFF2-40B4-BE49-F238E27FC236}">
+                <a16:creationId xmlns:a16="http://schemas.microsoft.com/office/drawing/2014/main" id="{3757BC94-775F-4B88-AADB-AFC9542C38DF}"/>
+              </a:ext>
+            </a:extLst>
+          </p:cNvPr>
+          <p:cNvPicPr>
+            <a:picLocks noChangeAspect="1"/>
+          </p:cNvPicPr>
+          <p:nvPr/>
+        </p:nvPicPr>
+        <p:blipFill>
+          <a:blip r:embed="rId4"/>
+          <a:stretch>
+            <a:fillRect/>
+          </a:stretch>
+        </p:blipFill>
+        <p:spPr>
+          <a:xfrm>
+            <a:off x="1948179" y="54244"/>
+            <a:ext cx="1274702" cy="1271847"/>
+          </a:xfrm>
+          <a:prstGeom prst="rect">
+            <a:avLst/>
+          </a:prstGeom>
+        </p:spPr>
+      </p:pic>
+      <p:pic>
+        <p:nvPicPr>
+          <p:cNvPr id="6" name="Picture 5" descr="A close up of a toy&#10;&#10;Description automatically generated">
+            <a:extLst>
+              <a:ext uri="{FF2B5EF4-FFF2-40B4-BE49-F238E27FC236}">
+                <a16:creationId xmlns:a16="http://schemas.microsoft.com/office/drawing/2014/main" id="{8AFC6B39-FA1B-426F-A38D-0C19FABC8DB0}"/>
+              </a:ext>
+            </a:extLst>
+          </p:cNvPr>
+          <p:cNvPicPr>
+            <a:picLocks noChangeAspect="1"/>
+          </p:cNvPicPr>
+          <p:nvPr/>
+        </p:nvPicPr>
+        <p:blipFill>
+          <a:blip r:embed="rId4"/>
+          <a:stretch>
+            <a:fillRect/>
+          </a:stretch>
+        </p:blipFill>
+        <p:spPr>
+          <a:xfrm>
+            <a:off x="6149559" y="54243"/>
+            <a:ext cx="1274702" cy="1271847"/>
+          </a:xfrm>
+          <a:prstGeom prst="rect">
+            <a:avLst/>
+          </a:prstGeom>
+        </p:spPr>
+      </p:pic>
     </p:spTree>
   </p:cSld>
   <p:clrMapOvr>
     <a:masterClrMapping/>
   </p:clrMapOvr>
-  <mc:AlternateContent xmlns:mc="http://schemas.openxmlformats.org/markup-compatibility/2006">
-    <mc:Choice xmlns:p159="http://schemas.microsoft.com/office/powerpoint/2015/09/main" Requires="p159">
+  <mc:AlternateContent xmlns:mc="http://schemas.openxmlformats.org/markup-compatibility/2006" xmlns:p159="http://schemas.microsoft.com/office/powerpoint/2015/09/main">
+    <mc:Choice Requires="p159">
       <p:transition xmlns:p14="http://schemas.microsoft.com/office/powerpoint/2010/main" spd="slow" p14:dur="2000">
         <p159:morph option="byObject"/>
       </p:transition>
     </mc:Choice>
-    <mc:Fallback>
+    <mc:Fallback xmlns="">
       <p:transition spd="slow">
         <p:fade/>
       </p:transition>

</xml_diff>

<commit_message>
Added Max Art to powerpoint
</commit_message>
<xml_diff>
--- a/Project 1.pptx
+++ b/Project 1.pptx
@@ -6203,48 +6203,6 @@
       </p:grpSpPr>
       <p:sp>
         <p:nvSpPr>
-          <p:cNvPr id="54" name="Google Shape;54;p13"/>
-          <p:cNvSpPr txBox="1">
-            <a:spLocks noGrp="1"/>
-          </p:cNvSpPr>
-          <p:nvPr>
-            <p:ph type="ctrTitle"/>
-          </p:nvPr>
-        </p:nvSpPr>
-        <p:spPr>
-          <a:xfrm>
-            <a:off x="-702445" y="-70680"/>
-            <a:ext cx="8520600" cy="1292571"/>
-          </a:xfrm>
-          <a:prstGeom prst="rect">
-            <a:avLst/>
-          </a:prstGeom>
-        </p:spPr>
-        <p:txBody>
-          <a:bodyPr spcFirstLastPara="1" wrap="square" lIns="91425" tIns="91425" rIns="91425" bIns="91425" anchor="b" anchorCtr="0">
-            <a:noAutofit/>
-          </a:bodyPr>
-          <a:lstStyle/>
-          <a:p>
-            <a:pPr marL="0" lvl="0" indent="0" algn="ctr" rtl="0">
-              <a:spcBef>
-                <a:spcPts val="0"/>
-              </a:spcBef>
-              <a:spcAft>
-                <a:spcPts val="0"/>
-              </a:spcAft>
-              <a:buNone/>
-            </a:pPr>
-            <a:r>
-              <a:rPr lang="en" dirty="0"/>
-              <a:t>Wanderlust</a:t>
-            </a:r>
-            <a:endParaRPr dirty="0"/>
-          </a:p>
-        </p:txBody>
-      </p:sp>
-      <p:sp>
-        <p:nvSpPr>
           <p:cNvPr id="55" name="Google Shape;55;p13"/>
           <p:cNvSpPr txBox="1">
             <a:spLocks noGrp="1"/>
@@ -6255,8 +6213,8 @@
         </p:nvSpPr>
         <p:spPr>
           <a:xfrm rot="21059485">
-            <a:off x="2204318" y="3753772"/>
-            <a:ext cx="6920309" cy="792600"/>
+            <a:off x="5148574" y="3919071"/>
+            <a:ext cx="3947664" cy="921041"/>
           </a:xfrm>
           <a:prstGeom prst="rect">
             <a:avLst/>
@@ -6267,7 +6225,7 @@
         </p:spPr>
         <p:txBody>
           <a:bodyPr spcFirstLastPara="1" wrap="square" lIns="91425" tIns="91425" rIns="91425" bIns="91425" anchor="t" anchorCtr="0">
-            <a:noAutofit/>
+            <a:normAutofit fontScale="85000" lnSpcReduction="20000"/>
           </a:bodyPr>
           <a:lstStyle/>
           <a:p>
@@ -6296,6 +6254,36 @@
           </a:p>
         </p:txBody>
       </p:sp>
+      <p:pic>
+        <p:nvPicPr>
+          <p:cNvPr id="5" name="Picture 4" descr="A picture containing drawing&#10;&#10;Description automatically generated">
+            <a:extLst>
+              <a:ext uri="{FF2B5EF4-FFF2-40B4-BE49-F238E27FC236}">
+                <a16:creationId xmlns:a16="http://schemas.microsoft.com/office/drawing/2014/main" id="{1D3E4A7C-FB0A-4F13-BFCD-D110FD40EBC9}"/>
+              </a:ext>
+            </a:extLst>
+          </p:cNvPr>
+          <p:cNvPicPr>
+            <a:picLocks noChangeAspect="1"/>
+          </p:cNvPicPr>
+          <p:nvPr/>
+        </p:nvPicPr>
+        <p:blipFill>
+          <a:blip r:embed="rId4"/>
+          <a:stretch>
+            <a:fillRect/>
+          </a:stretch>
+        </p:blipFill>
+        <p:spPr>
+          <a:xfrm>
+            <a:off x="143946" y="185752"/>
+            <a:ext cx="6551322" cy="1342064"/>
+          </a:xfrm>
+          <a:prstGeom prst="rect">
+            <a:avLst/>
+          </a:prstGeom>
+        </p:spPr>
+      </p:pic>
     </p:spTree>
   </p:cSld>
   <p:clrMapOvr>

</xml_diff>